<commit_message>
made changes to ppt and style.scss
</commit_message>
<xml_diff>
--- a/PresentationSlides.pptx
+++ b/PresentationSlides.pptx
@@ -7223,7 +7223,7 @@
           <a:p>
             <a:r>
               <a:rPr lang="en-US" dirty="0" smtClean="0"/>
-              <a:t>WTF is </a:t>
+              <a:t>What is </a:t>
             </a:r>
             <a:r>
               <a:rPr lang="en-US" dirty="0" err="1" smtClean="0"/>
@@ -7258,7 +7258,7 @@
             </a:r>
             <a:r>
               <a:rPr lang="en-US" dirty="0" smtClean="0"/>
-              <a:t> is what we use when we write SCSS! </a:t>
+              <a:t> is a scripting language that we can use when we write SCSS! </a:t>
             </a:r>
             <a:r>
               <a:rPr lang="en-US" dirty="0" err="1" smtClean="0"/>
@@ -7266,7 +7266,7 @@
             </a:r>
             <a:r>
               <a:rPr lang="en-US" dirty="0" smtClean="0"/>
-              <a:t> supports a number of awesome features that can make Sass a powerful improvement over vanilla CSS.</a:t>
+              <a:t> supports a number of awesome programming features that can make Sass a powerful improvement over vanilla CSS.</a:t>
             </a:r>
             <a:endParaRPr lang="en-US" dirty="0"/>
           </a:p>
@@ -7343,7 +7343,7 @@
         <p:spPr/>
         <p:txBody>
           <a:bodyPr>
-            <a:normAutofit fontScale="62500" lnSpcReduction="20000"/>
+            <a:normAutofit fontScale="55000" lnSpcReduction="20000"/>
           </a:bodyPr>
           <a:lstStyle/>
           <a:p>
@@ -7369,13 +7369,32 @@
           <a:p>
             <a:r>
               <a:rPr lang="en-US" dirty="0" smtClean="0"/>
-              <a:t>2. Functions</a:t>
-            </a:r>
-          </a:p>
-          <a:p>
+              <a:t>2. Nested CSS!</a:t>
+            </a:r>
+          </a:p>
+          <a:p>
+            <a:r>
+              <a:rPr lang="en-US" dirty="0"/>
+              <a:t>3</a:t>
+            </a:r>
             <a:r>
               <a:rPr lang="en-US" dirty="0" smtClean="0"/>
-              <a:t>3. Control Flow:</a:t>
+              <a:t>. Functions/</a:t>
+            </a:r>
+            <a:r>
+              <a:rPr lang="en-US" dirty="0" err="1" smtClean="0"/>
+              <a:t>Mixins</a:t>
+            </a:r>
+            <a:endParaRPr lang="en-US" dirty="0" smtClean="0"/>
+          </a:p>
+          <a:p>
+            <a:r>
+              <a:rPr lang="en-US" dirty="0"/>
+              <a:t>4</a:t>
+            </a:r>
+            <a:r>
+              <a:rPr lang="en-US" dirty="0" smtClean="0"/>
+              <a:t>. Control Flow:</a:t>
             </a:r>
           </a:p>
           <a:p>
@@ -7415,12 +7434,8 @@
           </a:p>
           <a:p>
             <a:r>
-              <a:rPr lang="en-US" dirty="0"/>
-              <a:t>4</a:t>
-            </a:r>
-            <a:r>
               <a:rPr lang="en-US" dirty="0" smtClean="0"/>
-              <a:t>. Basic Data types and structures:</a:t>
+              <a:t>5. Basic Data types and structures:</a:t>
             </a:r>
           </a:p>
           <a:p>
@@ -7461,6 +7476,13 @@
             <a:r>
               <a:rPr lang="en-US" dirty="0" smtClean="0"/>
               <a:t>- colors</a:t>
+            </a:r>
+          </a:p>
+          <a:p>
+            <a:pPr lvl="1"/>
+            <a:r>
+              <a:rPr lang="en-US" dirty="0" smtClean="0"/>
+              <a:t>- maps</a:t>
             </a:r>
           </a:p>
           <a:p>
@@ -7573,7 +7595,7 @@
             <a:pPr lvl="1"/>
             <a:r>
               <a:rPr lang="en-US" dirty="0" smtClean="0"/>
-              <a:t>- we can start to apply parametric thinking to styling systems:</a:t>
+              <a:t>- we can start to apply parametric thinking to develop styling systems/frameworks:</a:t>
             </a:r>
           </a:p>
           <a:p>
@@ -7657,7 +7679,7 @@
             </a:r>
             <a:r>
               <a:rPr lang="is-IS" dirty="0" smtClean="0"/>
-              <a:t>…and less verbose?</a:t>
+              <a:t>…</a:t>
             </a:r>
             <a:endParaRPr lang="en-US" dirty="0"/>
           </a:p>
@@ -7709,8 +7731,12 @@
               </a:rPr>
               <a:t>and less verbose syntax. </a:t>
             </a:r>
-          </a:p>
-          <a:p>
+            <a:r>
+              <a:rPr lang="en-US" dirty="0" smtClean="0">
+                <a:effectLst/>
+              </a:rPr>
+              <a:t>We can develop our own libraries and frameworks!</a:t>
+            </a:r>
             <a:endParaRPr lang="en-US" dirty="0"/>
           </a:p>
         </p:txBody>
@@ -7844,13 +7870,13 @@
               <a:rPr lang="en-US" sz="1400" dirty="0">
                 <a:effectLst/>
               </a:rPr>
-              <a:t>” container with a </a:t>
+              <a:t>” container </a:t>
             </a:r>
             <a:r>
               <a:rPr lang="en-US" sz="1400" dirty="0" smtClean="0">
                 <a:effectLst/>
               </a:rPr>
-              <a:t>some </a:t>
+              <a:t>with some </a:t>
             </a:r>
             <a:r>
               <a:rPr lang="en-US" sz="1400" dirty="0">
@@ -7949,10 +7975,16 @@
           <a:lstStyle/>
           <a:p>
             <a:r>
+              <a:rPr lang="en-US" dirty="0" smtClean="0">
+                <a:effectLst/>
+              </a:rPr>
+              <a:t>Generator Specification</a:t>
+            </a:r>
+            <a:r>
               <a:rPr lang="en-US" dirty="0">
                 <a:effectLst/>
               </a:rPr>
-              <a:t>Specification:</a:t>
+              <a:t>:</a:t>
             </a:r>
           </a:p>
           <a:p>

</xml_diff>